<commit_message>
SemComp - alterações mínimas na apresentação
Qualificação
- apresentação finalizada com as sugestões do professor/pessoal
</commit_message>
<xml_diff>
--- a/1-Meus-Artigos/Minicurso-SemComp2011/minicurso-SemComp2011.pptx
+++ b/1-Meus-Artigos/Minicurso-SemComp2011/minicurso-SemComp2011.pptx
@@ -4853,7 +4853,7 @@
           <a:p>
             <a:fld id="{3B08EA5F-FCDD-4E71-A476-C80220943304}" type="datetimeFigureOut">
               <a:rPr lang="en-US" smtClean="0"/>
-              <a:t>9/17/2011</a:t>
+              <a:t>9/18/2011</a:t>
             </a:fld>
             <a:endParaRPr lang="en-US"/>
           </a:p>
@@ -5018,7 +5018,7 @@
           <a:p>
             <a:fld id="{47CC7157-18AF-49FC-A090-38B995ABA613}" type="datetimeFigureOut">
               <a:rPr lang="en-US" smtClean="0"/>
-              <a:t>9/17/2011</a:t>
+              <a:t>9/18/2011</a:t>
             </a:fld>
             <a:endParaRPr lang="en-US"/>
           </a:p>
@@ -6224,7 +6224,6 @@
               <a:rPr lang="en-US" dirty="0" smtClean="0"/>
               <a:t>03.cpp</a:t>
             </a:r>
-            <a:endParaRPr lang="en-US" dirty="0" smtClean="0"/>
           </a:p>
           <a:p>
             <a:r>
@@ -9630,7 +9629,7 @@
           <a:p>
             <a:fld id="{694E3CD6-E129-4C33-B031-11F0E12BB3DC}" type="datetime1">
               <a:rPr lang="en-US" smtClean="0"/>
-              <a:t>9/17/2011</a:t>
+              <a:t>9/18/2011</a:t>
             </a:fld>
             <a:endParaRPr lang="en-US"/>
           </a:p>
@@ -9800,7 +9799,7 @@
           <a:p>
             <a:fld id="{FBA2D0FC-F746-45CE-B8E8-439BDF163482}" type="datetime1">
               <a:rPr lang="en-US" smtClean="0"/>
-              <a:t>9/17/2011</a:t>
+              <a:t>9/18/2011</a:t>
             </a:fld>
             <a:endParaRPr lang="en-US"/>
           </a:p>
@@ -9980,7 +9979,7 @@
           <a:p>
             <a:fld id="{A05B66E8-A753-4A2F-A202-D8EF6B896203}" type="datetime1">
               <a:rPr lang="en-US" smtClean="0"/>
-              <a:t>9/17/2011</a:t>
+              <a:t>9/18/2011</a:t>
             </a:fld>
             <a:endParaRPr lang="en-US"/>
           </a:p>
@@ -10207,7 +10206,7 @@
           <a:p>
             <a:fld id="{CC934D44-3823-4F81-93F1-2D8C8B1A77F5}" type="datetime1">
               <a:rPr lang="en-US" smtClean="0"/>
-              <a:t>9/17/2011</a:t>
+              <a:t>9/18/2011</a:t>
             </a:fld>
             <a:endParaRPr lang="en-US"/>
           </a:p>
@@ -10467,7 +10466,7 @@
           <a:p>
             <a:fld id="{3A7387F5-D3BA-44CF-830B-A61576007458}" type="datetime1">
               <a:rPr lang="en-US" smtClean="0"/>
-              <a:t>9/17/2011</a:t>
+              <a:t>9/18/2011</a:t>
             </a:fld>
             <a:endParaRPr lang="en-US"/>
           </a:p>
@@ -10755,7 +10754,7 @@
           <a:p>
             <a:fld id="{630E3D14-46FD-4629-A63A-5270C4B7B3AD}" type="datetime1">
               <a:rPr lang="en-US" smtClean="0"/>
-              <a:t>9/17/2011</a:t>
+              <a:t>9/18/2011</a:t>
             </a:fld>
             <a:endParaRPr lang="en-US"/>
           </a:p>
@@ -11177,7 +11176,7 @@
           <a:p>
             <a:fld id="{073D4D00-7332-4A72-A5D4-82855B9D83F1}" type="datetime1">
               <a:rPr lang="en-US" smtClean="0"/>
-              <a:t>9/17/2011</a:t>
+              <a:t>9/18/2011</a:t>
             </a:fld>
             <a:endParaRPr lang="en-US"/>
           </a:p>
@@ -11295,7 +11294,7 @@
           <a:p>
             <a:fld id="{522AF267-1908-48B6-8DFA-463D3C3AD2E8}" type="datetime1">
               <a:rPr lang="en-US" smtClean="0"/>
-              <a:t>9/17/2011</a:t>
+              <a:t>9/18/2011</a:t>
             </a:fld>
             <a:endParaRPr lang="en-US"/>
           </a:p>
@@ -11390,7 +11389,7 @@
           <a:p>
             <a:fld id="{985A6243-CB5E-4769-BC41-15AB5A3F9E2B}" type="datetime1">
               <a:rPr lang="en-US" smtClean="0"/>
-              <a:t>9/17/2011</a:t>
+              <a:t>9/18/2011</a:t>
             </a:fld>
             <a:endParaRPr lang="en-US"/>
           </a:p>
@@ -11667,7 +11666,7 @@
           <a:p>
             <a:fld id="{DFC1705B-63B5-4FED-88E6-EC675BE8F8DB}" type="datetime1">
               <a:rPr lang="en-US" smtClean="0"/>
-              <a:t>9/17/2011</a:t>
+              <a:t>9/18/2011</a:t>
             </a:fld>
             <a:endParaRPr lang="en-US"/>
           </a:p>
@@ -11920,7 +11919,7 @@
           <a:p>
             <a:fld id="{FEFE9096-C013-4F6B-85CA-CFAFDD3DA892}" type="datetime1">
               <a:rPr lang="en-US" smtClean="0"/>
-              <a:t>9/17/2011</a:t>
+              <a:t>9/18/2011</a:t>
             </a:fld>
             <a:endParaRPr lang="en-US"/>
           </a:p>
@@ -12133,7 +12132,7 @@
           <a:p>
             <a:fld id="{EAA96CE7-FFB7-46C8-9AC2-E51AE4B15C37}" type="datetime1">
               <a:rPr lang="en-US" smtClean="0"/>
-              <a:t>9/17/2011</a:t>
+              <a:t>9/18/2011</a:t>
             </a:fld>
             <a:endParaRPr lang="en-US"/>
           </a:p>
@@ -13390,36 +13389,22 @@
             </a:r>
             <a:r>
               <a:rPr lang="pt-BR" dirty="0" smtClean="0"/>
-              <a:t>, 2008</a:t>
-            </a:r>
+              <a:t>, 2008.</a:t>
+            </a:r>
+          </a:p>
+          <a:p>
+            <a:endParaRPr lang="pt-BR" dirty="0" smtClean="0"/>
+          </a:p>
+          <a:p>
             <a:r>
               <a:rPr lang="pt-BR" dirty="0" smtClean="0"/>
-              <a:t>.</a:t>
-            </a:r>
-          </a:p>
-          <a:p>
-            <a:endParaRPr lang="pt-BR" dirty="0" smtClean="0"/>
-          </a:p>
-          <a:p>
-            <a:r>
-              <a:rPr lang="pt-BR" dirty="0" smtClean="0"/>
-              <a:t>OpenCV </a:t>
-            </a:r>
-            <a:r>
-              <a:rPr lang="pt-BR" dirty="0" smtClean="0"/>
-              <a:t>Wiki - </a:t>
+              <a:t>OpenCV Wiki - </a:t>
             </a:r>
             <a:r>
               <a:rPr lang="pt-BR" dirty="0" smtClean="0">
                 <a:hlinkClick r:id="rId3"/>
               </a:rPr>
-              <a:t>http://opencv.willowgarage.com/wiki</a:t>
-            </a:r>
-            <a:r>
-              <a:rPr lang="pt-BR" dirty="0" smtClean="0">
-                <a:hlinkClick r:id="rId3"/>
-              </a:rPr>
-              <a:t>/</a:t>
+              <a:t>http://opencv.willowgarage.com/wiki/</a:t>
             </a:r>
             <a:endParaRPr lang="pt-BR" dirty="0" smtClean="0"/>
           </a:p>
@@ -13519,13 +13504,7 @@
               <a:rPr lang="pt-BR" dirty="0" smtClean="0">
                 <a:hlinkClick r:id="rId4"/>
               </a:rPr>
-              <a:t>http://</a:t>
-            </a:r>
-            <a:r>
-              <a:rPr lang="pt-BR" dirty="0" smtClean="0">
-                <a:hlinkClick r:id="rId4"/>
-              </a:rPr>
-              <a:t>opennet.net/sites/opennet.net/files/GreenDam_bulletin.pdf</a:t>
+              <a:t>http://opennet.net/sites/opennet.net/files/GreenDam_bulletin.pdf</a:t>
             </a:r>
             <a:r>
               <a:rPr lang="pt-BR" dirty="0" smtClean="0"/>
@@ -13904,13 +13883,7 @@
               <a:rPr lang="pt-BR" dirty="0" smtClean="0">
                 <a:hlinkClick r:id="rId3"/>
               </a:rPr>
-              <a:t>http</a:t>
-            </a:r>
-            <a:r>
-              <a:rPr lang="pt-BR" dirty="0" smtClean="0">
-                <a:hlinkClick r:id="rId3"/>
-              </a:rPr>
-              <a:t>://www.icmc.usp.br/~zinga/</a:t>
+              <a:t>http://www.icmc.usp.br/~zinga/</a:t>
             </a:r>
             <a:endParaRPr lang="pt-BR" dirty="0" smtClean="0"/>
           </a:p>
@@ -16580,16 +16553,26 @@
           <a:lstStyle/>
           <a:p>
             <a:r>
-              <a:rPr lang="pt-BR" smtClean="0"/>
+              <a:rPr lang="pt-BR" dirty="0" smtClean="0"/>
               <a:t>Interesse da turma</a:t>
             </a:r>
           </a:p>
           <a:p>
             <a:r>
-              <a:rPr lang="pt-BR" smtClean="0"/>
-              <a:t>Conhecimento Técnico</a:t>
-            </a:r>
-            <a:endParaRPr lang="pt-BR"/>
+              <a:rPr lang="pt-BR" dirty="0" smtClean="0"/>
+              <a:t>Conhecimento </a:t>
+            </a:r>
+            <a:r>
+              <a:rPr lang="pt-BR" dirty="0" smtClean="0"/>
+              <a:t>Técnico</a:t>
+            </a:r>
+          </a:p>
+          <a:p>
+            <a:r>
+              <a:rPr lang="pt-BR" dirty="0" smtClean="0"/>
+              <a:t>Daltonismo</a:t>
+            </a:r>
+            <a:endParaRPr lang="pt-BR" dirty="0"/>
           </a:p>
         </p:txBody>
       </p:sp>
@@ -16616,6 +16599,47 @@
           </a:p>
         </p:txBody>
       </p:sp>
+      <p:pic>
+        <p:nvPicPr>
+          <p:cNvPr id="1027" name="Picture 3" descr="C:\Documents and Settings\Matheus\Desktop\Mestrado\1-Meus-Artigos\Minicurso-SemComp2011\imagens\daltonismo.jpg"/>
+          <p:cNvPicPr>
+            <a:picLocks noChangeAspect="1" noChangeArrowheads="1"/>
+          </p:cNvPicPr>
+          <p:nvPr/>
+        </p:nvPicPr>
+        <p:blipFill>
+          <a:blip r:embed="rId3">
+            <a:extLst>
+              <a:ext uri="{28A0092B-C50C-407E-A947-70E740481C1C}">
+                <a14:useLocalDpi xmlns:a14="http://schemas.microsoft.com/office/drawing/2010/main" val="0"/>
+              </a:ext>
+            </a:extLst>
+          </a:blip>
+          <a:srcRect/>
+          <a:stretch>
+            <a:fillRect/>
+          </a:stretch>
+        </p:blipFill>
+        <p:spPr bwMode="auto">
+          <a:xfrm>
+            <a:off x="2892245" y="3429000"/>
+            <a:ext cx="2571750" cy="2571750"/>
+          </a:xfrm>
+          <a:prstGeom prst="rect">
+            <a:avLst/>
+          </a:prstGeom>
+          <a:noFill/>
+          <a:extLst>
+            <a:ext uri="{909E8E84-426E-40DD-AFC4-6F175D3DCCD1}">
+              <a14:hiddenFill xmlns:a14="http://schemas.microsoft.com/office/drawing/2010/main">
+                <a:solidFill>
+                  <a:srgbClr val="FFFFFF"/>
+                </a:solidFill>
+              </a14:hiddenFill>
+            </a:ext>
+          </a:extLst>
+        </p:spPr>
+      </p:pic>
     </p:spTree>
     <p:extLst>
       <p:ext uri="{BB962C8B-B14F-4D97-AF65-F5344CB8AC3E}">
@@ -39710,19 +39734,7 @@
             <a:p>
               <a:r>
                 <a:rPr lang="pt-BR" sz="1400" dirty="0" smtClean="0"/>
-                <a:t>Processo de conversão anaglífica </a:t>
-              </a:r>
-              <a:r>
-                <a:rPr lang="pt-BR" sz="1400" dirty="0" smtClean="0"/>
-                <a:t>vermelho-ciano </a:t>
-              </a:r>
-              <a:r>
-                <a:rPr lang="pt-BR" sz="1400" dirty="0" smtClean="0"/>
-                <a:t>(Zingarelli, </a:t>
-              </a:r>
-              <a:r>
-                <a:rPr lang="pt-BR" sz="1400" dirty="0" smtClean="0"/>
-                <a:t>2011 – adaptado)</a:t>
+                <a:t>Processo de conversão anaglífica vermelho-ciano (Zingarelli, 2011 – adaptado)</a:t>
               </a:r>
               <a:endParaRPr lang="pt-BR" sz="1400" dirty="0"/>
             </a:p>
@@ -40668,7 +40680,6 @@
               <a:rPr lang="pt-BR" sz="1800" dirty="0" smtClean="0"/>
               <a:t>....</a:t>
             </a:r>
-            <a:endParaRPr lang="pt-BR" sz="1800" dirty="0" smtClean="0"/>
           </a:p>
           <a:p>
             <a:pPr lvl="1"/>
@@ -42672,25 +42683,7 @@
                 </a:effectLst>
                 <a:latin typeface="Palatino Linotype" pitchFamily="18" charset="0"/>
               </a:rPr>
-              <a:t>Fundamentos – </a:t>
-            </a:r>
-            <a:r>
-              <a:rPr lang="pt-BR" dirty="0" smtClean="0">
-                <a:solidFill>
-                  <a:schemeClr val="tx2">
-                    <a:lumMod val="75000"/>
-                  </a:schemeClr>
-                </a:solidFill>
-                <a:effectLst>
-                  <a:outerShdw blurRad="50800" dist="38100" dir="2700000" algn="tl" rotWithShape="0">
-                    <a:prstClr val="black">
-                      <a:alpha val="40000"/>
-                    </a:prstClr>
-                  </a:outerShdw>
-                </a:effectLst>
-                <a:latin typeface="Palatino Linotype" pitchFamily="18" charset="0"/>
-              </a:rPr>
-              <a:t>Links interessantes</a:t>
+              <a:t>Fundamentos – Links interessantes</a:t>
             </a:r>
             <a:endParaRPr lang="pt-BR" dirty="0">
               <a:solidFill>
@@ -43031,13 +43024,7 @@
               <a:rPr lang="pt-BR" dirty="0">
                 <a:hlinkClick r:id="rId2"/>
               </a:rPr>
-              <a:t>http://www.3dshop.com.br</a:t>
-            </a:r>
-            <a:r>
-              <a:rPr lang="pt-BR" dirty="0">
-                <a:hlinkClick r:id="rId2"/>
-              </a:rPr>
-              <a:t>/</a:t>
+              <a:t>http://www.3dshop.com.br/</a:t>
             </a:r>
             <a:endParaRPr lang="pt-BR" dirty="0"/>
           </a:p>
@@ -43589,13 +43576,8 @@
           <a:p>
             <a:r>
               <a:rPr lang="pt-BR" dirty="0" smtClean="0"/>
-              <a:t>Abrir </a:t>
-            </a:r>
-            <a:r>
-              <a:rPr lang="pt-BR" dirty="0" smtClean="0"/>
-              <a:t>imagem (par estéreo)</a:t>
-            </a:r>
-            <a:endParaRPr lang="pt-BR" dirty="0" smtClean="0"/>
+              <a:t>Abrir imagem (par estéreo)</a:t>
+            </a:r>
           </a:p>
           <a:p>
             <a:r>
@@ -43628,14 +43610,12 @@
               <a:rPr lang="pt-BR" dirty="0" smtClean="0"/>
               <a:t>Criação de um anáglifo vermelho-ciano</a:t>
             </a:r>
-            <a:endParaRPr lang="pt-BR" dirty="0" smtClean="0"/>
           </a:p>
           <a:p>
             <a:r>
               <a:rPr lang="pt-BR" dirty="0" smtClean="0"/>
               <a:t>Gravar anáglifo</a:t>
             </a:r>
-            <a:endParaRPr lang="pt-BR" dirty="0" smtClean="0"/>
           </a:p>
         </p:txBody>
       </p:sp>
@@ -43785,19 +43765,7 @@
             <a:p>
               <a:r>
                 <a:rPr lang="pt-BR" sz="1400" dirty="0" smtClean="0"/>
-                <a:t>Processo de conversão anaglífica </a:t>
-              </a:r>
-              <a:r>
-                <a:rPr lang="pt-BR" sz="1400" dirty="0" smtClean="0"/>
-                <a:t>vermelho-ciano </a:t>
-              </a:r>
-              <a:r>
-                <a:rPr lang="pt-BR" sz="1400" dirty="0" smtClean="0"/>
-                <a:t>(Zingarelli, </a:t>
-              </a:r>
-              <a:r>
-                <a:rPr lang="pt-BR" sz="1400" dirty="0" smtClean="0"/>
-                <a:t>2011 – adaptado)</a:t>
+                <a:t>Processo de conversão anaglífica vermelho-ciano (Zingarelli, 2011 – adaptado)</a:t>
               </a:r>
               <a:endParaRPr lang="pt-BR" sz="1400" dirty="0"/>
             </a:p>
@@ -44248,11 +44216,7 @@
           <a:p>
             <a:r>
               <a:rPr lang="pt-BR" dirty="0" smtClean="0"/>
-              <a:t>Abrir </a:t>
-            </a:r>
-            <a:r>
-              <a:rPr lang="pt-BR" dirty="0" smtClean="0"/>
-              <a:t>vídeo</a:t>
+              <a:t>Abrir vídeo</a:t>
             </a:r>
           </a:p>
           <a:p>
@@ -44266,7 +44230,6 @@
               <a:rPr lang="pt-BR" dirty="0" smtClean="0"/>
               <a:t>Gravar vídeo</a:t>
             </a:r>
-            <a:endParaRPr lang="pt-BR" dirty="0" smtClean="0"/>
           </a:p>
         </p:txBody>
       </p:sp>
@@ -44858,14 +44821,7 @@
                 <a:latin typeface="Courier New" pitchFamily="49" charset="0"/>
                 <a:cs typeface="Courier New" pitchFamily="49" charset="0"/>
               </a:rPr>
-              <a:t>cvRelease</a:t>
-            </a:r>
-            <a:r>
-              <a:rPr lang="pt-BR" dirty="0" err="1" smtClean="0">
-                <a:latin typeface="Courier New" pitchFamily="49" charset="0"/>
-                <a:cs typeface="Courier New" pitchFamily="49" charset="0"/>
-              </a:rPr>
-              <a:t>Image</a:t>
+              <a:t>cvReleaseImage</a:t>
             </a:r>
             <a:r>
               <a:rPr lang="pt-BR" dirty="0" smtClean="0">
@@ -44873,9 +44829,6 @@
               </a:rPr>
               <a:t> para cada frame recebido</a:t>
             </a:r>
-            <a:endParaRPr lang="pt-BR" dirty="0" smtClean="0">
-              <a:cs typeface="Courier New" pitchFamily="49" charset="0"/>
-            </a:endParaRPr>
           </a:p>
           <a:p>
             <a:pPr marL="457200" lvl="1" indent="0">
@@ -45377,11 +45330,7 @@
           <a:p>
             <a:r>
               <a:rPr lang="pt-BR" dirty="0" smtClean="0"/>
-              <a:t>Abrir </a:t>
-            </a:r>
-            <a:r>
-              <a:rPr lang="pt-BR" dirty="0" smtClean="0"/>
-              <a:t>vídeo</a:t>
+              <a:t>Abrir vídeo</a:t>
             </a:r>
           </a:p>
           <a:p>
@@ -45395,7 +45344,6 @@
               <a:rPr lang="pt-BR" dirty="0" smtClean="0"/>
               <a:t>Gravar vídeo</a:t>
             </a:r>
-            <a:endParaRPr lang="pt-BR" dirty="0" smtClean="0"/>
           </a:p>
         </p:txBody>
       </p:sp>
@@ -45664,11 +45612,7 @@
           <a:p>
             <a:r>
               <a:rPr lang="pt-BR" dirty="0" smtClean="0"/>
-              <a:t>Reproduç</a:t>
-            </a:r>
-            <a:r>
-              <a:rPr lang="pt-BR" dirty="0" smtClean="0"/>
-              <a:t>ão</a:t>
+              <a:t>Reprodução</a:t>
             </a:r>
             <a:endParaRPr lang="pt-BR" dirty="0"/>
           </a:p>
@@ -45955,10 +45899,6 @@
               </a:rPr>
               <a:t>);</a:t>
             </a:r>
-            <a:endParaRPr lang="pt-BR" sz="2400" dirty="0">
-              <a:latin typeface="Courier New" pitchFamily="49" charset="0"/>
-              <a:cs typeface="Courier New" pitchFamily="49" charset="0"/>
-            </a:endParaRPr>
           </a:p>
         </p:txBody>
       </p:sp>
@@ -46240,11 +46180,7 @@
           <a:p>
             <a:r>
               <a:rPr lang="pt-BR" dirty="0" smtClean="0"/>
-              <a:t>Abrir </a:t>
-            </a:r>
-            <a:r>
-              <a:rPr lang="pt-BR" dirty="0" smtClean="0"/>
-              <a:t>vídeo</a:t>
+              <a:t>Abrir vídeo</a:t>
             </a:r>
           </a:p>
           <a:p>
@@ -46258,7 +46194,6 @@
               <a:rPr lang="pt-BR" dirty="0" smtClean="0"/>
               <a:t>Gravar vídeo</a:t>
             </a:r>
-            <a:endParaRPr lang="pt-BR" dirty="0" smtClean="0"/>
           </a:p>
         </p:txBody>
       </p:sp>
@@ -47886,11 +47821,7 @@
           <a:p>
             <a:r>
               <a:rPr lang="pt-BR" dirty="0" smtClean="0"/>
-              <a:t>Abrir </a:t>
-            </a:r>
-            <a:r>
-              <a:rPr lang="pt-BR" dirty="0" smtClean="0"/>
-              <a:t>vídeo</a:t>
+              <a:t>Abrir vídeo</a:t>
             </a:r>
           </a:p>
           <a:p>
@@ -47904,7 +47835,6 @@
               <a:rPr lang="pt-BR" dirty="0" smtClean="0"/>
               <a:t>Gravar vídeo</a:t>
             </a:r>
-            <a:endParaRPr lang="pt-BR" dirty="0" smtClean="0"/>
           </a:p>
         </p:txBody>
       </p:sp>
@@ -48440,13 +48370,8 @@
           <a:p>
             <a:r>
               <a:rPr lang="pt-BR" dirty="0" smtClean="0"/>
-              <a:t>Abrir </a:t>
-            </a:r>
-            <a:r>
-              <a:rPr lang="pt-BR" dirty="0" smtClean="0"/>
-              <a:t>vídeo</a:t>
-            </a:r>
-            <a:endParaRPr lang="pt-BR" dirty="0" smtClean="0"/>
+              <a:t>Abrir vídeo</a:t>
+            </a:r>
           </a:p>
           <a:p>
             <a:r>
@@ -48500,7 +48425,6 @@
               <a:rPr lang="pt-BR" dirty="0" smtClean="0"/>
               <a:t>Criação de um anáglifo vermelho-ciano</a:t>
             </a:r>
-            <a:endParaRPr lang="pt-BR" dirty="0" smtClean="0"/>
           </a:p>
           <a:p>
             <a:pPr lvl="1"/>
@@ -48508,7 +48432,6 @@
               <a:rPr lang="pt-BR" dirty="0" smtClean="0"/>
               <a:t>Gravar anáglifo</a:t>
             </a:r>
-            <a:endParaRPr lang="pt-BR" dirty="0" smtClean="0"/>
           </a:p>
         </p:txBody>
       </p:sp>
@@ -48658,19 +48581,7 @@
             <a:p>
               <a:r>
                 <a:rPr lang="pt-BR" sz="1400" dirty="0" smtClean="0"/>
-                <a:t>Processo de conversão anaglífica </a:t>
-              </a:r>
-              <a:r>
-                <a:rPr lang="pt-BR" sz="1400" dirty="0" smtClean="0"/>
-                <a:t>vermelho-ciano </a:t>
-              </a:r>
-              <a:r>
-                <a:rPr lang="pt-BR" sz="1400" dirty="0" smtClean="0"/>
-                <a:t>(Zingarelli, </a:t>
-              </a:r>
-              <a:r>
-                <a:rPr lang="pt-BR" sz="1400" dirty="0" smtClean="0"/>
-                <a:t>2011 – adaptado)</a:t>
+                <a:t>Processo de conversão anaglífica vermelho-ciano (Zingarelli, 2011 – adaptado)</a:t>
               </a:r>
               <a:endParaRPr lang="pt-BR" sz="1400" dirty="0"/>
             </a:p>
@@ -48850,11 +48761,7 @@
             </a:r>
             <a:r>
               <a:rPr lang="pt-BR" i="1" dirty="0" err="1" smtClean="0"/>
-              <a:t>a</a:t>
-            </a:r>
-            <a:r>
-              <a:rPr lang="pt-BR" i="1" dirty="0" err="1" smtClean="0"/>
-              <a:t>bove-below</a:t>
+              <a:t>above-below</a:t>
             </a:r>
             <a:r>
               <a:rPr lang="pt-BR" dirty="0" smtClean="0"/>
@@ -48876,7 +48783,6 @@
               <a:rPr lang="pt-BR" dirty="0" smtClean="0"/>
               <a:t>Adicionar novo parâmetro ao programa para que o usuário informe o tipo do vídeo</a:t>
             </a:r>
-            <a:endParaRPr lang="pt-BR" dirty="0" smtClean="0"/>
           </a:p>
         </p:txBody>
       </p:sp>

</xml_diff>

<commit_message>
SemComp - adição de link para os vídeos do léo na apresentação
</commit_message>
<xml_diff>
--- a/1-Meus-Artigos/Minicurso-SemComp2011/minicurso-SemComp2011.pptx
+++ b/1-Meus-Artigos/Minicurso-SemComp2011/minicurso-SemComp2011.pptx
@@ -13541,7 +13541,12 @@
             <p:ph type="sldNum" sz="quarter" idx="12"/>
           </p:nvPr>
         </p:nvSpPr>
-        <p:spPr/>
+        <p:spPr>
+          <a:xfrm>
+            <a:off x="8474670" y="6239915"/>
+            <a:ext cx="525775" cy="365125"/>
+          </a:xfrm>
+        </p:spPr>
         <p:txBody>
           <a:bodyPr/>
           <a:lstStyle/>
@@ -13551,7 +13556,7 @@
               <a:pPr/>
               <a:t>101</a:t>
             </a:fld>
-            <a:endParaRPr lang="en-US" smtClean="0"/>
+            <a:endParaRPr lang="en-US" dirty="0" smtClean="0"/>
           </a:p>
         </p:txBody>
       </p:sp>
@@ -14183,7 +14188,7 @@
         </p:nvSpPr>
         <p:spPr>
           <a:xfrm>
-            <a:off x="8518861" y="6239915"/>
+            <a:off x="8497824" y="6255258"/>
             <a:ext cx="481584" cy="365125"/>
           </a:xfrm>
         </p:spPr>
@@ -16560,11 +16565,7 @@
           <a:p>
             <a:r>
               <a:rPr lang="pt-BR" dirty="0" smtClean="0"/>
-              <a:t>Conhecimento </a:t>
-            </a:r>
-            <a:r>
-              <a:rPr lang="pt-BR" dirty="0" smtClean="0"/>
-              <a:t>Técnico</a:t>
+              <a:t>Conhecimento Técnico</a:t>
             </a:r>
           </a:p>
           <a:p>
@@ -48364,7 +48365,7 @@
         <p:spPr/>
         <p:txBody>
           <a:bodyPr>
-            <a:normAutofit/>
+            <a:normAutofit lnSpcReduction="10000"/>
           </a:bodyPr>
           <a:lstStyle/>
           <a:p>
@@ -48430,8 +48431,21 @@
             <a:pPr lvl="1"/>
             <a:r>
               <a:rPr lang="pt-BR" dirty="0" smtClean="0"/>
-              <a:t>Gravar anáglifo</a:t>
-            </a:r>
+              <a:t>Gravar </a:t>
+            </a:r>
+            <a:r>
+              <a:rPr lang="pt-BR" dirty="0" smtClean="0"/>
+              <a:t>anáglifo</a:t>
+            </a:r>
+          </a:p>
+          <a:p>
+            <a:r>
+              <a:rPr lang="pt-BR" dirty="0">
+                <a:hlinkClick r:id="rId3"/>
+              </a:rPr>
+              <a:t>http://200.136.217.194/videoestereo/</a:t>
+            </a:r>
+            <a:endParaRPr lang="pt-BR" dirty="0" smtClean="0"/>
           </a:p>
         </p:txBody>
       </p:sp>

</xml_diff>